<commit_message>
push from home computer
</commit_message>
<xml_diff>
--- a/NodeInAction.pptx
+++ b/NodeInAction.pptx
@@ -4,6 +4,14 @@
   <p:sldMasterIdLst>
     <p:sldMasterId id="2147483648" r:id="rId1"/>
   </p:sldMasterIdLst>
+  <p:sldIdLst>
+    <p:sldId id="256" r:id="rId2"/>
+    <p:sldId id="257" r:id="rId3"/>
+    <p:sldId id="258" r:id="rId4"/>
+    <p:sldId id="259" r:id="rId5"/>
+    <p:sldId id="260" r:id="rId6"/>
+    <p:sldId id="261" r:id="rId7"/>
+  </p:sldIdLst>
   <p:sldSz cx="9144000" cy="6858000" type="screen4x3"/>
   <p:notesSz cx="6858000" cy="9144000"/>
   <p:defaultTextStyle>
@@ -286,7 +294,7 @@
             <a:fld id="{1D8BD707-D9CF-40AE-B4C6-C98DA3205C09}" type="datetimeFigureOut">
               <a:rPr lang="en-US" smtClean="0"/>
               <a:pPr/>
-              <a:t>9/18/2006</a:t>
+              <a:t>8/29/2012</a:t>
             </a:fld>
             <a:endParaRPr lang="en-US"/>
           </a:p>
@@ -453,7 +461,7 @@
             <a:fld id="{1D8BD707-D9CF-40AE-B4C6-C98DA3205C09}" type="datetimeFigureOut">
               <a:rPr lang="en-US" smtClean="0"/>
               <a:pPr/>
-              <a:t>9/18/2006</a:t>
+              <a:t>8/29/2012</a:t>
             </a:fld>
             <a:endParaRPr lang="en-US"/>
           </a:p>
@@ -630,7 +638,7 @@
             <a:fld id="{1D8BD707-D9CF-40AE-B4C6-C98DA3205C09}" type="datetimeFigureOut">
               <a:rPr lang="en-US" smtClean="0"/>
               <a:pPr/>
-              <a:t>9/18/2006</a:t>
+              <a:t>8/29/2012</a:t>
             </a:fld>
             <a:endParaRPr lang="en-US"/>
           </a:p>
@@ -797,7 +805,7 @@
             <a:fld id="{1D8BD707-D9CF-40AE-B4C6-C98DA3205C09}" type="datetimeFigureOut">
               <a:rPr lang="en-US" smtClean="0"/>
               <a:pPr/>
-              <a:t>9/18/2006</a:t>
+              <a:t>8/29/2012</a:t>
             </a:fld>
             <a:endParaRPr lang="en-US"/>
           </a:p>
@@ -1040,7 +1048,7 @@
             <a:fld id="{1D8BD707-D9CF-40AE-B4C6-C98DA3205C09}" type="datetimeFigureOut">
               <a:rPr lang="en-US" smtClean="0"/>
               <a:pPr/>
-              <a:t>9/18/2006</a:t>
+              <a:t>8/29/2012</a:t>
             </a:fld>
             <a:endParaRPr lang="en-US"/>
           </a:p>
@@ -1325,7 +1333,7 @@
             <a:fld id="{1D8BD707-D9CF-40AE-B4C6-C98DA3205C09}" type="datetimeFigureOut">
               <a:rPr lang="en-US" smtClean="0"/>
               <a:pPr/>
-              <a:t>9/18/2006</a:t>
+              <a:t>8/29/2012</a:t>
             </a:fld>
             <a:endParaRPr lang="en-US"/>
           </a:p>
@@ -1744,7 +1752,7 @@
             <a:fld id="{1D8BD707-D9CF-40AE-B4C6-C98DA3205C09}" type="datetimeFigureOut">
               <a:rPr lang="en-US" smtClean="0"/>
               <a:pPr/>
-              <a:t>9/18/2006</a:t>
+              <a:t>8/29/2012</a:t>
             </a:fld>
             <a:endParaRPr lang="en-US"/>
           </a:p>
@@ -1859,7 +1867,7 @@
             <a:fld id="{1D8BD707-D9CF-40AE-B4C6-C98DA3205C09}" type="datetimeFigureOut">
               <a:rPr lang="en-US" smtClean="0"/>
               <a:pPr/>
-              <a:t>9/18/2006</a:t>
+              <a:t>8/29/2012</a:t>
             </a:fld>
             <a:endParaRPr lang="en-US"/>
           </a:p>
@@ -1951,7 +1959,7 @@
             <a:fld id="{1D8BD707-D9CF-40AE-B4C6-C98DA3205C09}" type="datetimeFigureOut">
               <a:rPr lang="en-US" smtClean="0"/>
               <a:pPr/>
-              <a:t>9/18/2006</a:t>
+              <a:t>8/29/2012</a:t>
             </a:fld>
             <a:endParaRPr lang="en-US"/>
           </a:p>
@@ -2225,7 +2233,7 @@
             <a:fld id="{1D8BD707-D9CF-40AE-B4C6-C98DA3205C09}" type="datetimeFigureOut">
               <a:rPr lang="en-US" smtClean="0"/>
               <a:pPr/>
-              <a:t>9/18/2006</a:t>
+              <a:t>8/29/2012</a:t>
             </a:fld>
             <a:endParaRPr lang="en-US"/>
           </a:p>
@@ -2475,7 +2483,7 @@
             <a:fld id="{1D8BD707-D9CF-40AE-B4C6-C98DA3205C09}" type="datetimeFigureOut">
               <a:rPr lang="en-US" smtClean="0"/>
               <a:pPr/>
-              <a:t>9/18/2006</a:t>
+              <a:t>8/29/2012</a:t>
             </a:fld>
             <a:endParaRPr lang="en-US"/>
           </a:p>
@@ -2685,7 +2693,7 @@
             <a:fld id="{1D8BD707-D9CF-40AE-B4C6-C98DA3205C09}" type="datetimeFigureOut">
               <a:rPr lang="en-US" smtClean="0"/>
               <a:pPr/>
-              <a:t>9/18/2006</a:t>
+              <a:t>8/29/2012</a:t>
             </a:fld>
             <a:endParaRPr lang="en-US"/>
           </a:p>
@@ -3037,6 +3045,704 @@
     </p:otherStyle>
   </p:txStyles>
 </p:sldMaster>
+</file>
+
+<file path=ppt/slides/slide1.xml><?xml version="1.0" encoding="utf-8"?>
+<p:sld xmlns:a="http://schemas.openxmlformats.org/drawingml/2006/main" xmlns:r="http://schemas.openxmlformats.org/officeDocument/2006/relationships" xmlns:p="http://schemas.openxmlformats.org/presentationml/2006/main">
+  <p:cSld>
+    <p:spTree>
+      <p:nvGrpSpPr>
+        <p:cNvPr id="1" name=""/>
+        <p:cNvGrpSpPr/>
+        <p:nvPr/>
+      </p:nvGrpSpPr>
+      <p:grpSpPr>
+        <a:xfrm>
+          <a:off x="0" y="0"/>
+          <a:ext cx="0" cy="0"/>
+          <a:chOff x="0" y="0"/>
+          <a:chExt cx="0" cy="0"/>
+        </a:xfrm>
+      </p:grpSpPr>
+      <p:sp>
+        <p:nvSpPr>
+          <p:cNvPr id="2" name="Title 1"/>
+          <p:cNvSpPr>
+            <a:spLocks noGrp="1"/>
+          </p:cNvSpPr>
+          <p:nvPr>
+            <p:ph type="ctrTitle"/>
+          </p:nvPr>
+        </p:nvSpPr>
+        <p:spPr/>
+        <p:txBody>
+          <a:bodyPr/>
+          <a:lstStyle/>
+          <a:p>
+            <a:r>
+              <a:rPr lang="en-US" dirty="0" smtClean="0"/>
+              <a:t>Node in Action</a:t>
+            </a:r>
+            <a:endParaRPr lang="en-US" dirty="0"/>
+          </a:p>
+        </p:txBody>
+      </p:sp>
+      <p:sp>
+        <p:nvSpPr>
+          <p:cNvPr id="3" name="Subtitle 2"/>
+          <p:cNvSpPr>
+            <a:spLocks noGrp="1"/>
+          </p:cNvSpPr>
+          <p:nvPr>
+            <p:ph type="subTitle" idx="1"/>
+          </p:nvPr>
+        </p:nvSpPr>
+        <p:spPr/>
+        <p:txBody>
+          <a:bodyPr/>
+          <a:lstStyle/>
+          <a:p>
+            <a:endParaRPr lang="en-US"/>
+          </a:p>
+        </p:txBody>
+      </p:sp>
+    </p:spTree>
+  </p:cSld>
+  <p:clrMapOvr>
+    <a:masterClrMapping/>
+  </p:clrMapOvr>
+</p:sld>
+</file>
+
+<file path=ppt/slides/slide2.xml><?xml version="1.0" encoding="utf-8"?>
+<p:sld xmlns:a="http://schemas.openxmlformats.org/drawingml/2006/main" xmlns:r="http://schemas.openxmlformats.org/officeDocument/2006/relationships" xmlns:p="http://schemas.openxmlformats.org/presentationml/2006/main">
+  <p:cSld>
+    <p:spTree>
+      <p:nvGrpSpPr>
+        <p:cNvPr id="1" name=""/>
+        <p:cNvGrpSpPr/>
+        <p:nvPr/>
+      </p:nvGrpSpPr>
+      <p:grpSpPr>
+        <a:xfrm>
+          <a:off x="0" y="0"/>
+          <a:ext cx="0" cy="0"/>
+          <a:chOff x="0" y="0"/>
+          <a:chExt cx="0" cy="0"/>
+        </a:xfrm>
+      </p:grpSpPr>
+      <p:sp>
+        <p:nvSpPr>
+          <p:cNvPr id="2" name="Title 1"/>
+          <p:cNvSpPr>
+            <a:spLocks noGrp="1"/>
+          </p:cNvSpPr>
+          <p:nvPr>
+            <p:ph type="title"/>
+          </p:nvPr>
+        </p:nvSpPr>
+        <p:spPr/>
+        <p:txBody>
+          <a:bodyPr/>
+          <a:lstStyle/>
+          <a:p>
+            <a:r>
+              <a:rPr lang="en-US" dirty="0" smtClean="0"/>
+              <a:t>Node</a:t>
+            </a:r>
+            <a:endParaRPr lang="en-US" dirty="0"/>
+          </a:p>
+        </p:txBody>
+      </p:sp>
+      <p:sp>
+        <p:nvSpPr>
+          <p:cNvPr id="3" name="Content Placeholder 2"/>
+          <p:cNvSpPr>
+            <a:spLocks noGrp="1"/>
+          </p:cNvSpPr>
+          <p:nvPr>
+            <p:ph idx="1"/>
+          </p:nvPr>
+        </p:nvSpPr>
+        <p:spPr/>
+        <p:txBody>
+          <a:bodyPr>
+            <a:normAutofit/>
+          </a:bodyPr>
+          <a:lstStyle/>
+          <a:p>
+            <a:r>
+              <a:rPr lang="en-US" dirty="0" smtClean="0"/>
+              <a:t>Node is an </a:t>
+            </a:r>
+            <a:r>
+              <a:rPr lang="en-US" dirty="0" smtClean="0"/>
+              <a:t>open-source, minimalist </a:t>
+            </a:r>
+            <a:r>
+              <a:rPr lang="en-US" dirty="0" smtClean="0"/>
+              <a:t>server-side JavaScript TCP/IP framework that merges the speed </a:t>
+            </a:r>
+            <a:r>
+              <a:rPr lang="en-US" dirty="0" smtClean="0"/>
+              <a:t>of Google's </a:t>
+            </a:r>
+            <a:r>
+              <a:rPr lang="en-US" dirty="0" smtClean="0"/>
+              <a:t>V8 JavaScript engine (used by the Google Chrome web browser) </a:t>
+            </a:r>
+            <a:r>
+              <a:rPr lang="en-US" dirty="0" smtClean="0"/>
+              <a:t>with two </a:t>
+            </a:r>
+            <a:r>
+              <a:rPr lang="en-US" dirty="0" smtClean="0"/>
+              <a:t>projects, </a:t>
+            </a:r>
+            <a:r>
+              <a:rPr lang="en-US" dirty="0" err="1" smtClean="0"/>
+              <a:t>libev</a:t>
+            </a:r>
+            <a:r>
+              <a:rPr lang="en-US" dirty="0" smtClean="0"/>
+              <a:t> and </a:t>
+            </a:r>
+            <a:r>
+              <a:rPr lang="en-US" dirty="0" err="1" smtClean="0"/>
+              <a:t>libeio</a:t>
+            </a:r>
+            <a:r>
+              <a:rPr lang="en-US" dirty="0" smtClean="0"/>
+              <a:t>.</a:t>
+            </a:r>
+          </a:p>
+          <a:p>
+            <a:r>
+              <a:rPr lang="en-US" dirty="0" smtClean="0"/>
+              <a:t>These projects that provide highly efficient </a:t>
+            </a:r>
+            <a:r>
+              <a:rPr lang="en-US" dirty="0" smtClean="0"/>
+              <a:t>TCP/IP networking </a:t>
+            </a:r>
+            <a:r>
+              <a:rPr lang="en-US" dirty="0" smtClean="0"/>
+              <a:t>capability and "asynchronous" programming </a:t>
+            </a:r>
+            <a:r>
+              <a:rPr lang="en-US" dirty="0" smtClean="0"/>
+              <a:t>support</a:t>
+            </a:r>
+            <a:endParaRPr lang="en-US" dirty="0"/>
+          </a:p>
+        </p:txBody>
+      </p:sp>
+    </p:spTree>
+  </p:cSld>
+  <p:clrMapOvr>
+    <a:masterClrMapping/>
+  </p:clrMapOvr>
+</p:sld>
+</file>
+
+<file path=ppt/slides/slide3.xml><?xml version="1.0" encoding="utf-8"?>
+<p:sld xmlns:a="http://schemas.openxmlformats.org/drawingml/2006/main" xmlns:r="http://schemas.openxmlformats.org/officeDocument/2006/relationships" xmlns:p="http://schemas.openxmlformats.org/presentationml/2006/main">
+  <p:cSld>
+    <p:spTree>
+      <p:nvGrpSpPr>
+        <p:cNvPr id="1" name=""/>
+        <p:cNvGrpSpPr/>
+        <p:nvPr/>
+      </p:nvGrpSpPr>
+      <p:grpSpPr>
+        <a:xfrm>
+          <a:off x="0" y="0"/>
+          <a:ext cx="0" cy="0"/>
+          <a:chOff x="0" y="0"/>
+          <a:chExt cx="0" cy="0"/>
+        </a:xfrm>
+      </p:grpSpPr>
+      <p:sp>
+        <p:nvSpPr>
+          <p:cNvPr id="2" name="Title 1"/>
+          <p:cNvSpPr>
+            <a:spLocks noGrp="1"/>
+          </p:cNvSpPr>
+          <p:nvPr>
+            <p:ph type="title"/>
+          </p:nvPr>
+        </p:nvSpPr>
+        <p:spPr/>
+        <p:txBody>
+          <a:bodyPr/>
+          <a:lstStyle/>
+          <a:p>
+            <a:r>
+              <a:rPr lang="en-US" dirty="0" err="1" smtClean="0"/>
+              <a:t>WordSquared</a:t>
+            </a:r>
+            <a:endParaRPr lang="en-US" dirty="0"/>
+          </a:p>
+        </p:txBody>
+      </p:sp>
+      <p:sp>
+        <p:nvSpPr>
+          <p:cNvPr id="3" name="Content Placeholder 2"/>
+          <p:cNvSpPr>
+            <a:spLocks noGrp="1"/>
+          </p:cNvSpPr>
+          <p:nvPr>
+            <p:ph idx="1"/>
+          </p:nvPr>
+        </p:nvSpPr>
+        <p:spPr/>
+        <p:txBody>
+          <a:bodyPr/>
+          <a:lstStyle/>
+          <a:p>
+            <a:r>
+              <a:rPr lang="en-US" dirty="0" smtClean="0"/>
+              <a:t>Massive Tiles</a:t>
+            </a:r>
+          </a:p>
+          <a:p>
+            <a:r>
+              <a:rPr lang="en-US" dirty="0" smtClean="0"/>
+              <a:t>Limited Viewport</a:t>
+            </a:r>
+          </a:p>
+          <a:p>
+            <a:r>
+              <a:rPr lang="en-US" dirty="0" smtClean="0"/>
+              <a:t>How to push</a:t>
+            </a:r>
+          </a:p>
+          <a:p>
+            <a:pPr lvl="1"/>
+            <a:r>
+              <a:rPr lang="en-US" dirty="0" smtClean="0"/>
+              <a:t>Original ‘Pusher’ service</a:t>
+            </a:r>
+          </a:p>
+          <a:p>
+            <a:pPr lvl="1"/>
+            <a:r>
+              <a:rPr lang="en-US" dirty="0" smtClean="0"/>
+              <a:t>Now use Socket.io</a:t>
+            </a:r>
+          </a:p>
+          <a:p>
+            <a:pPr lvl="1"/>
+            <a:r>
+              <a:rPr lang="en-US" dirty="0" smtClean="0"/>
+              <a:t>Both of these update mechanisms leverage </a:t>
+            </a:r>
+            <a:r>
+              <a:rPr lang="en-US" dirty="0" smtClean="0"/>
+              <a:t>the </a:t>
+            </a:r>
+            <a:r>
+              <a:rPr lang="en-US" dirty="0" err="1" smtClean="0"/>
+              <a:t>WebSocket</a:t>
+            </a:r>
+            <a:r>
+              <a:rPr lang="en-US" dirty="0" smtClean="0"/>
+              <a:t> protocol</a:t>
+            </a:r>
+            <a:endParaRPr lang="en-US" dirty="0"/>
+          </a:p>
+        </p:txBody>
+      </p:sp>
+    </p:spTree>
+  </p:cSld>
+  <p:clrMapOvr>
+    <a:masterClrMapping/>
+  </p:clrMapOvr>
+</p:sld>
+</file>
+
+<file path=ppt/slides/slide4.xml><?xml version="1.0" encoding="utf-8"?>
+<p:sld xmlns:a="http://schemas.openxmlformats.org/drawingml/2006/main" xmlns:r="http://schemas.openxmlformats.org/officeDocument/2006/relationships" xmlns:p="http://schemas.openxmlformats.org/presentationml/2006/main">
+  <p:cSld>
+    <p:spTree>
+      <p:nvGrpSpPr>
+        <p:cNvPr id="1" name=""/>
+        <p:cNvGrpSpPr/>
+        <p:nvPr/>
+      </p:nvGrpSpPr>
+      <p:grpSpPr>
+        <a:xfrm>
+          <a:off x="0" y="0"/>
+          <a:ext cx="0" cy="0"/>
+          <a:chOff x="0" y="0"/>
+          <a:chExt cx="0" cy="0"/>
+        </a:xfrm>
+      </p:grpSpPr>
+      <p:sp>
+        <p:nvSpPr>
+          <p:cNvPr id="2" name="Title 1"/>
+          <p:cNvSpPr>
+            <a:spLocks noGrp="1"/>
+          </p:cNvSpPr>
+          <p:nvPr>
+            <p:ph type="title"/>
+          </p:nvPr>
+        </p:nvSpPr>
+        <p:spPr/>
+        <p:txBody>
+          <a:bodyPr/>
+          <a:lstStyle/>
+          <a:p>
+            <a:r>
+              <a:rPr lang="en-US" dirty="0" smtClean="0"/>
+              <a:t>Node Advantage</a:t>
+            </a:r>
+            <a:endParaRPr lang="en-US" dirty="0"/>
+          </a:p>
+        </p:txBody>
+      </p:sp>
+      <p:sp>
+        <p:nvSpPr>
+          <p:cNvPr id="3" name="Content Placeholder 2"/>
+          <p:cNvSpPr>
+            <a:spLocks noGrp="1"/>
+          </p:cNvSpPr>
+          <p:nvPr>
+            <p:ph idx="1"/>
+          </p:nvPr>
+        </p:nvSpPr>
+        <p:spPr/>
+        <p:txBody>
+          <a:bodyPr/>
+          <a:lstStyle/>
+          <a:p>
+            <a:r>
+              <a:rPr lang="en-US" dirty="0" smtClean="0"/>
+              <a:t>Modern Web Technologies</a:t>
+            </a:r>
+          </a:p>
+          <a:p>
+            <a:r>
+              <a:rPr lang="en-US" dirty="0" smtClean="0"/>
+              <a:t>Asynchronous Programming </a:t>
+            </a:r>
+          </a:p>
+          <a:p>
+            <a:r>
+              <a:rPr lang="en-US" dirty="0" smtClean="0"/>
+              <a:t>Not Just for Web</a:t>
+            </a:r>
+          </a:p>
+          <a:p>
+            <a:pPr lvl="1"/>
+            <a:r>
+              <a:rPr lang="en-US" dirty="0" smtClean="0"/>
+              <a:t>for the creation of </a:t>
+            </a:r>
+            <a:r>
+              <a:rPr lang="en-US" dirty="0" smtClean="0"/>
+              <a:t>new TCP/IP </a:t>
+            </a:r>
+            <a:r>
+              <a:rPr lang="en-US" dirty="0" smtClean="0"/>
+              <a:t>protocols, client/server applications, command-line applications, and more</a:t>
+            </a:r>
+            <a:endParaRPr lang="en-US" dirty="0"/>
+          </a:p>
+        </p:txBody>
+      </p:sp>
+    </p:spTree>
+  </p:cSld>
+  <p:clrMapOvr>
+    <a:masterClrMapping/>
+  </p:clrMapOvr>
+</p:sld>
+</file>
+
+<file path=ppt/slides/slide5.xml><?xml version="1.0" encoding="utf-8"?>
+<p:sld xmlns:a="http://schemas.openxmlformats.org/drawingml/2006/main" xmlns:r="http://schemas.openxmlformats.org/officeDocument/2006/relationships" xmlns:p="http://schemas.openxmlformats.org/presentationml/2006/main">
+  <p:cSld>
+    <p:spTree>
+      <p:nvGrpSpPr>
+        <p:cNvPr id="1" name=""/>
+        <p:cNvGrpSpPr/>
+        <p:nvPr/>
+      </p:nvGrpSpPr>
+      <p:grpSpPr>
+        <a:xfrm>
+          <a:off x="0" y="0"/>
+          <a:ext cx="0" cy="0"/>
+          <a:chOff x="0" y="0"/>
+          <a:chExt cx="0" cy="0"/>
+        </a:xfrm>
+      </p:grpSpPr>
+      <p:sp>
+        <p:nvSpPr>
+          <p:cNvPr id="2" name="Title 1"/>
+          <p:cNvSpPr>
+            <a:spLocks noGrp="1"/>
+          </p:cNvSpPr>
+          <p:nvPr>
+            <p:ph type="title"/>
+          </p:nvPr>
+        </p:nvSpPr>
+        <p:spPr/>
+        <p:txBody>
+          <a:bodyPr/>
+          <a:lstStyle/>
+          <a:p>
+            <a:r>
+              <a:rPr lang="en-US" dirty="0" smtClean="0"/>
+              <a:t>History of Node</a:t>
+            </a:r>
+            <a:endParaRPr lang="en-US" dirty="0"/>
+          </a:p>
+        </p:txBody>
+      </p:sp>
+      <p:sp>
+        <p:nvSpPr>
+          <p:cNvPr id="3" name="Content Placeholder 2"/>
+          <p:cNvSpPr>
+            <a:spLocks noGrp="1"/>
+          </p:cNvSpPr>
+          <p:nvPr>
+            <p:ph idx="1"/>
+          </p:nvPr>
+        </p:nvSpPr>
+        <p:spPr/>
+        <p:txBody>
+          <a:bodyPr/>
+          <a:lstStyle/>
+          <a:p>
+            <a:r>
+              <a:rPr lang="en-US" dirty="0" smtClean="0"/>
+              <a:t>Before Node</a:t>
+            </a:r>
+          </a:p>
+          <a:p>
+            <a:pPr lvl="1"/>
+            <a:r>
+              <a:rPr lang="en-US" dirty="0" smtClean="0"/>
+              <a:t>Web as Document</a:t>
+            </a:r>
+          </a:p>
+          <a:p>
+            <a:pPr lvl="1"/>
+            <a:r>
+              <a:rPr lang="en-US" dirty="0" smtClean="0"/>
+              <a:t>Form driven App</a:t>
+            </a:r>
+          </a:p>
+          <a:p>
+            <a:pPr lvl="1"/>
+            <a:r>
+              <a:rPr lang="en-US" dirty="0" smtClean="0"/>
+              <a:t>AJAX</a:t>
+            </a:r>
+          </a:p>
+          <a:p>
+            <a:pPr lvl="1"/>
+            <a:r>
+              <a:rPr lang="en-US" dirty="0" smtClean="0"/>
+              <a:t>Real-Time App</a:t>
+            </a:r>
+          </a:p>
+          <a:p>
+            <a:r>
+              <a:rPr lang="en-US" dirty="0" smtClean="0"/>
+              <a:t>Node</a:t>
+            </a:r>
+          </a:p>
+          <a:p>
+            <a:pPr lvl="1"/>
+            <a:r>
+              <a:rPr lang="en-US" dirty="0" smtClean="0"/>
+              <a:t>Event Driven (</a:t>
+            </a:r>
+            <a:r>
+              <a:rPr lang="en-US" dirty="0" err="1" smtClean="0"/>
+              <a:t>Async</a:t>
+            </a:r>
+            <a:r>
+              <a:rPr lang="en-US" dirty="0" smtClean="0"/>
+              <a:t>)</a:t>
+            </a:r>
+          </a:p>
+          <a:p>
+            <a:pPr lvl="1"/>
+            <a:endParaRPr lang="en-US" dirty="0"/>
+          </a:p>
+        </p:txBody>
+      </p:sp>
+    </p:spTree>
+  </p:cSld>
+  <p:clrMapOvr>
+    <a:masterClrMapping/>
+  </p:clrMapOvr>
+</p:sld>
+</file>
+
+<file path=ppt/slides/slide6.xml><?xml version="1.0" encoding="utf-8"?>
+<p:sld xmlns:a="http://schemas.openxmlformats.org/drawingml/2006/main" xmlns:r="http://schemas.openxmlformats.org/officeDocument/2006/relationships" xmlns:p="http://schemas.openxmlformats.org/presentationml/2006/main">
+  <p:cSld>
+    <p:spTree>
+      <p:nvGrpSpPr>
+        <p:cNvPr id="1" name=""/>
+        <p:cNvGrpSpPr/>
+        <p:nvPr/>
+      </p:nvGrpSpPr>
+      <p:grpSpPr>
+        <a:xfrm>
+          <a:off x="0" y="0"/>
+          <a:ext cx="0" cy="0"/>
+          <a:chOff x="0" y="0"/>
+          <a:chExt cx="0" cy="0"/>
+        </a:xfrm>
+      </p:grpSpPr>
+      <p:sp>
+        <p:nvSpPr>
+          <p:cNvPr id="2" name="Title 1"/>
+          <p:cNvSpPr>
+            <a:spLocks noGrp="1"/>
+          </p:cNvSpPr>
+          <p:nvPr>
+            <p:ph type="title"/>
+          </p:nvPr>
+        </p:nvSpPr>
+        <p:spPr/>
+        <p:txBody>
+          <a:bodyPr/>
+          <a:lstStyle/>
+          <a:p>
+            <a:r>
+              <a:rPr lang="en-US" dirty="0" smtClean="0"/>
+              <a:t>Node Conceptual Components</a:t>
+            </a:r>
+            <a:endParaRPr lang="en-US" dirty="0"/>
+          </a:p>
+        </p:txBody>
+      </p:sp>
+      <p:sp>
+        <p:nvSpPr>
+          <p:cNvPr id="3" name="Content Placeholder 2"/>
+          <p:cNvSpPr>
+            <a:spLocks noGrp="1"/>
+          </p:cNvSpPr>
+          <p:nvPr>
+            <p:ph idx="1"/>
+          </p:nvPr>
+        </p:nvSpPr>
+        <p:spPr>
+          <a:xfrm>
+            <a:off x="457200" y="1600200"/>
+            <a:ext cx="5715000" cy="4525963"/>
+          </a:xfrm>
+        </p:spPr>
+        <p:txBody>
+          <a:bodyPr/>
+          <a:lstStyle/>
+          <a:p>
+            <a:r>
+              <a:rPr lang="en-US" dirty="0" smtClean="0"/>
+              <a:t>Node Core</a:t>
+            </a:r>
+          </a:p>
+          <a:p>
+            <a:pPr lvl="1"/>
+            <a:r>
+              <a:rPr lang="en-US" dirty="0" smtClean="0"/>
+              <a:t>V8 Engine</a:t>
+            </a:r>
+          </a:p>
+          <a:p>
+            <a:pPr lvl="2"/>
+            <a:r>
+              <a:rPr lang="en-US" dirty="0" smtClean="0"/>
+              <a:t>Compiles instead of interpret </a:t>
+            </a:r>
+            <a:r>
+              <a:rPr lang="en-US" dirty="0" err="1" smtClean="0"/>
+              <a:t>Javascript</a:t>
+            </a:r>
+            <a:endParaRPr lang="en-US" dirty="0" smtClean="0"/>
+          </a:p>
+          <a:p>
+            <a:pPr lvl="1"/>
+            <a:r>
+              <a:rPr lang="en-US" dirty="0" err="1" smtClean="0"/>
+              <a:t>libev</a:t>
+            </a:r>
+            <a:r>
+              <a:rPr lang="en-US" dirty="0" smtClean="0"/>
+              <a:t>/</a:t>
+            </a:r>
+            <a:r>
+              <a:rPr lang="en-US" dirty="0" err="1" smtClean="0"/>
+              <a:t>libio</a:t>
+            </a:r>
+            <a:r>
+              <a:rPr lang="en-US" dirty="0" smtClean="0"/>
+              <a:t> (C libraries</a:t>
+            </a:r>
+            <a:r>
+              <a:rPr lang="en-US" smtClean="0"/>
+              <a:t>) </a:t>
+            </a:r>
+          </a:p>
+          <a:p>
+            <a:pPr lvl="2"/>
+            <a:r>
+              <a:rPr lang="en-US" smtClean="0"/>
+              <a:t>provide </a:t>
+            </a:r>
+            <a:r>
+              <a:rPr lang="en-US" dirty="0" smtClean="0"/>
+              <a:t>event driven networking and IO</a:t>
+            </a:r>
+          </a:p>
+          <a:p>
+            <a:endParaRPr lang="en-US" dirty="0"/>
+          </a:p>
+        </p:txBody>
+      </p:sp>
+      <p:pic>
+        <p:nvPicPr>
+          <p:cNvPr id="1026" name="Picture 2"/>
+          <p:cNvPicPr>
+            <a:picLocks noChangeAspect="1" noChangeArrowheads="1"/>
+          </p:cNvPicPr>
+          <p:nvPr/>
+        </p:nvPicPr>
+        <p:blipFill>
+          <a:blip r:embed="rId2" cstate="print"/>
+          <a:srcRect/>
+          <a:stretch>
+            <a:fillRect/>
+          </a:stretch>
+        </p:blipFill>
+        <p:spPr bwMode="auto">
+          <a:xfrm>
+            <a:off x="6019800" y="1676400"/>
+            <a:ext cx="2874441" cy="4805363"/>
+          </a:xfrm>
+          <a:prstGeom prst="rect">
+            <a:avLst/>
+          </a:prstGeom>
+          <a:noFill/>
+          <a:ln w="9525">
+            <a:noFill/>
+            <a:miter lim="800000"/>
+            <a:headEnd/>
+            <a:tailEnd/>
+          </a:ln>
+        </p:spPr>
+      </p:pic>
+    </p:spTree>
+  </p:cSld>
+  <p:clrMapOvr>
+    <a:masterClrMapping/>
+  </p:clrMapOvr>
+</p:sld>
 </file>
 
 <file path=ppt/theme/theme1.xml><?xml version="1.0" encoding="utf-8"?>

</xml_diff>